<commit_message>
- Figuras traduzidas; - Pequenos erros consertados; - Problemas nas tabelas foram corrigidos; - Figuras redimensionadas para cada trecho;
Versão Final gerada e enviada!
</commit_message>
<xml_diff>
--- a/Figures/DDO-OFDM_II_signals.pptx
+++ b/Figures/DDO-OFDM_II_signals.pptx
@@ -10,7 +10,7 @@
   <p:sldIdLst>
     <p:sldId id="256" r:id="rId2"/>
   </p:sldIdLst>
-  <p:sldSz cx="2303463" cy="2160588"/>
+  <p:sldSz cx="2303463" cy="1800225"/>
   <p:notesSz cx="6834188" cy="9979025"/>
   <p:defaultTextStyle>
     <a:defPPr>
@@ -110,7 +110,7 @@
   <p:extLst>
     <p:ext uri="{EFAFB233-063F-42B5-8137-9DF3F51BA10A}">
       <p15:sldGuideLst xmlns:p15="http://schemas.microsoft.com/office/powerpoint/2012/main">
-        <p15:guide id="1" orient="horz" pos="681" userDrawn="1">
+        <p15:guide id="1" orient="horz" pos="567" userDrawn="1">
           <p15:clr>
             <a:srgbClr val="A4A3A4"/>
           </p15:clr>
@@ -208,7 +208,7 @@
           <a:p>
             <a:fld id="{68E42D50-087F-43D2-99AA-4863E42CF0E8}" type="datetimeFigureOut">
               <a:rPr lang="pt-BR" smtClean="0"/>
-              <a:t>12/01/2014</a:t>
+              <a:t>16/09/2014</a:t>
             </a:fld>
             <a:endParaRPr lang="pt-BR"/>
           </a:p>
@@ -226,8 +226,8 @@
         </p:nvSpPr>
         <p:spPr>
           <a:xfrm>
-            <a:off x="1622425" y="1247775"/>
-            <a:ext cx="3589338" cy="3367088"/>
+            <a:off x="1263650" y="1247775"/>
+            <a:ext cx="4306888" cy="3367088"/>
           </a:xfrm>
           <a:prstGeom prst="rect">
             <a:avLst/>
@@ -367,7 +367,7 @@
           <a:p>
             <a:fld id="{E0C22F06-E74D-463D-96DD-8BD4984889F8}" type="slidenum">
               <a:rPr lang="pt-BR" smtClean="0"/>
-              <a:t>‹#›</a:t>
+              <a:t>‹nº›</a:t>
             </a:fld>
             <a:endParaRPr lang="pt-BR"/>
           </a:p>
@@ -505,8 +505,8 @@
         </p:nvSpPr>
         <p:spPr>
           <a:xfrm>
-            <a:off x="1622425" y="1247775"/>
-            <a:ext cx="3589338" cy="3367088"/>
+            <a:off x="1263650" y="1247775"/>
+            <a:ext cx="4306888" cy="3367088"/>
           </a:xfrm>
         </p:spPr>
       </p:sp>
@@ -594,8 +594,8 @@
         </p:nvSpPr>
         <p:spPr>
           <a:xfrm>
-            <a:off x="172764" y="671194"/>
-            <a:ext cx="1957944" cy="463126"/>
+            <a:off x="172764" y="559248"/>
+            <a:ext cx="1957944" cy="385882"/>
           </a:xfrm>
         </p:spPr>
         <p:txBody>
@@ -622,8 +622,8 @@
         </p:nvSpPr>
         <p:spPr>
           <a:xfrm>
-            <a:off x="345523" y="1224339"/>
-            <a:ext cx="1612426" cy="552150"/>
+            <a:off x="345523" y="1020132"/>
+            <a:ext cx="1612426" cy="460057"/>
           </a:xfrm>
         </p:spPr>
         <p:txBody>
@@ -639,7 +639,7 @@
                 </a:solidFill>
               </a:defRPr>
             </a:lvl1pPr>
-            <a:lvl2pPr marL="53812" indent="0" algn="ctr">
+            <a:lvl2pPr marL="53808" indent="0" algn="ctr">
               <a:buNone/>
               <a:defRPr>
                 <a:solidFill>
@@ -649,7 +649,7 @@
                 </a:solidFill>
               </a:defRPr>
             </a:lvl2pPr>
-            <a:lvl3pPr marL="107625" indent="0" algn="ctr">
+            <a:lvl3pPr marL="107616" indent="0" algn="ctr">
               <a:buNone/>
               <a:defRPr>
                 <a:solidFill>
@@ -659,7 +659,7 @@
                 </a:solidFill>
               </a:defRPr>
             </a:lvl3pPr>
-            <a:lvl4pPr marL="161438" indent="0" algn="ctr">
+            <a:lvl4pPr marL="161423" indent="0" algn="ctr">
               <a:buNone/>
               <a:defRPr>
                 <a:solidFill>
@@ -669,7 +669,7 @@
                 </a:solidFill>
               </a:defRPr>
             </a:lvl4pPr>
-            <a:lvl5pPr marL="215250" indent="0" algn="ctr">
+            <a:lvl5pPr marL="215231" indent="0" algn="ctr">
               <a:buNone/>
               <a:defRPr>
                 <a:solidFill>
@@ -679,7 +679,7 @@
                 </a:solidFill>
               </a:defRPr>
             </a:lvl5pPr>
-            <a:lvl6pPr marL="269062" indent="0" algn="ctr">
+            <a:lvl6pPr marL="269038" indent="0" algn="ctr">
               <a:buNone/>
               <a:defRPr>
                 <a:solidFill>
@@ -689,7 +689,7 @@
                 </a:solidFill>
               </a:defRPr>
             </a:lvl6pPr>
-            <a:lvl7pPr marL="322875" indent="0" algn="ctr">
+            <a:lvl7pPr marL="322847" indent="0" algn="ctr">
               <a:buNone/>
               <a:defRPr>
                 <a:solidFill>
@@ -699,7 +699,7 @@
                 </a:solidFill>
               </a:defRPr>
             </a:lvl7pPr>
-            <a:lvl8pPr marL="376687" indent="0" algn="ctr">
+            <a:lvl8pPr marL="376653" indent="0" algn="ctr">
               <a:buNone/>
               <a:defRPr>
                 <a:solidFill>
@@ -709,7 +709,7 @@
                 </a:solidFill>
               </a:defRPr>
             </a:lvl8pPr>
-            <a:lvl9pPr marL="430500" indent="0" algn="ctr">
+            <a:lvl9pPr marL="430462" indent="0" algn="ctr">
               <a:buNone/>
               <a:defRPr>
                 <a:solidFill>
@@ -747,7 +747,7 @@
             <a:fld id="{3ECEDDD1-02F4-488A-9AC5-C581CF75A9CB}" type="datetimeFigureOut">
               <a:rPr lang="pt-BR" smtClean="0"/>
               <a:pPr/>
-              <a:t>12/01/2014</a:t>
+              <a:t>16/09/2014</a:t>
             </a:fld>
             <a:endParaRPr lang="pt-BR"/>
           </a:p>
@@ -790,7 +790,7 @@
             <a:fld id="{64423969-70E0-4A52-B5D9-B4270798E610}" type="slidenum">
               <a:rPr lang="pt-BR" smtClean="0"/>
               <a:pPr/>
-              <a:t>‹#›</a:t>
+              <a:t>‹nº›</a:t>
             </a:fld>
             <a:endParaRPr lang="pt-BR"/>
           </a:p>
@@ -914,7 +914,7 @@
             <a:fld id="{3ECEDDD1-02F4-488A-9AC5-C581CF75A9CB}" type="datetimeFigureOut">
               <a:rPr lang="pt-BR" smtClean="0"/>
               <a:pPr/>
-              <a:t>12/01/2014</a:t>
+              <a:t>16/09/2014</a:t>
             </a:fld>
             <a:endParaRPr lang="pt-BR"/>
           </a:p>
@@ -957,7 +957,7 @@
             <a:fld id="{64423969-70E0-4A52-B5D9-B4270798E610}" type="slidenum">
               <a:rPr lang="pt-BR" smtClean="0"/>
               <a:pPr/>
-              <a:t>‹#›</a:t>
+              <a:t>‹nº›</a:t>
             </a:fld>
             <a:endParaRPr lang="pt-BR"/>
           </a:p>
@@ -1000,8 +1000,8 @@
         </p:nvSpPr>
         <p:spPr>
           <a:xfrm>
-            <a:off x="1670017" y="86534"/>
-            <a:ext cx="518280" cy="1843502"/>
+            <a:off x="1670017" y="72104"/>
+            <a:ext cx="518280" cy="1536026"/>
           </a:xfrm>
         </p:spPr>
         <p:txBody>
@@ -1028,8 +1028,8 @@
         </p:nvSpPr>
         <p:spPr>
           <a:xfrm>
-            <a:off x="115178" y="86534"/>
-            <a:ext cx="1516447" cy="1843502"/>
+            <a:off x="115179" y="72104"/>
+            <a:ext cx="1516447" cy="1536026"/>
           </a:xfrm>
         </p:spPr>
         <p:txBody>
@@ -1091,7 +1091,7 @@
             <a:fld id="{3ECEDDD1-02F4-488A-9AC5-C581CF75A9CB}" type="datetimeFigureOut">
               <a:rPr lang="pt-BR" smtClean="0"/>
               <a:pPr/>
-              <a:t>12/01/2014</a:t>
+              <a:t>16/09/2014</a:t>
             </a:fld>
             <a:endParaRPr lang="pt-BR"/>
           </a:p>
@@ -1134,7 +1134,7 @@
             <a:fld id="{64423969-70E0-4A52-B5D9-B4270798E610}" type="slidenum">
               <a:rPr lang="pt-BR" smtClean="0"/>
               <a:pPr/>
-              <a:t>‹#›</a:t>
+              <a:t>‹nº›</a:t>
             </a:fld>
             <a:endParaRPr lang="pt-BR"/>
           </a:p>
@@ -1258,7 +1258,7 @@
             <a:fld id="{3ECEDDD1-02F4-488A-9AC5-C581CF75A9CB}" type="datetimeFigureOut">
               <a:rPr lang="pt-BR" smtClean="0"/>
               <a:pPr/>
-              <a:t>12/01/2014</a:t>
+              <a:t>16/09/2014</a:t>
             </a:fld>
             <a:endParaRPr lang="pt-BR"/>
           </a:p>
@@ -1301,7 +1301,7 @@
             <a:fld id="{64423969-70E0-4A52-B5D9-B4270798E610}" type="slidenum">
               <a:rPr lang="pt-BR" smtClean="0"/>
               <a:pPr/>
-              <a:t>‹#›</a:t>
+              <a:t>‹nº›</a:t>
             </a:fld>
             <a:endParaRPr lang="pt-BR"/>
           </a:p>
@@ -1344,8 +1344,8 @@
         </p:nvSpPr>
         <p:spPr>
           <a:xfrm>
-            <a:off x="181961" y="1388389"/>
-            <a:ext cx="1957944" cy="429117"/>
+            <a:off x="181961" y="1156823"/>
+            <a:ext cx="1957944" cy="357545"/>
           </a:xfrm>
         </p:spPr>
         <p:txBody>
@@ -1376,8 +1376,8 @@
         </p:nvSpPr>
         <p:spPr>
           <a:xfrm>
-            <a:off x="181961" y="915756"/>
-            <a:ext cx="1957944" cy="472628"/>
+            <a:off x="181961" y="763020"/>
+            <a:ext cx="1957944" cy="393799"/>
           </a:xfrm>
         </p:spPr>
         <p:txBody>
@@ -1393,7 +1393,7 @@
                 </a:solidFill>
               </a:defRPr>
             </a:lvl1pPr>
-            <a:lvl2pPr marL="53812" indent="0">
+            <a:lvl2pPr marL="53808" indent="0">
               <a:buNone/>
               <a:defRPr sz="212">
                 <a:solidFill>
@@ -1403,7 +1403,7 @@
                 </a:solidFill>
               </a:defRPr>
             </a:lvl2pPr>
-            <a:lvl3pPr marL="107625" indent="0">
+            <a:lvl3pPr marL="107616" indent="0">
               <a:buNone/>
               <a:defRPr sz="188">
                 <a:solidFill>
@@ -1413,7 +1413,7 @@
                 </a:solidFill>
               </a:defRPr>
             </a:lvl3pPr>
-            <a:lvl4pPr marL="161438" indent="0">
+            <a:lvl4pPr marL="161423" indent="0">
               <a:buNone/>
               <a:defRPr sz="165">
                 <a:solidFill>
@@ -1423,7 +1423,7 @@
                 </a:solidFill>
               </a:defRPr>
             </a:lvl4pPr>
-            <a:lvl5pPr marL="215250" indent="0">
+            <a:lvl5pPr marL="215231" indent="0">
               <a:buNone/>
               <a:defRPr sz="165">
                 <a:solidFill>
@@ -1433,7 +1433,7 @@
                 </a:solidFill>
               </a:defRPr>
             </a:lvl5pPr>
-            <a:lvl6pPr marL="269062" indent="0">
+            <a:lvl6pPr marL="269038" indent="0">
               <a:buNone/>
               <a:defRPr sz="165">
                 <a:solidFill>
@@ -1443,7 +1443,7 @@
                 </a:solidFill>
               </a:defRPr>
             </a:lvl6pPr>
-            <a:lvl7pPr marL="322875" indent="0">
+            <a:lvl7pPr marL="322847" indent="0">
               <a:buNone/>
               <a:defRPr sz="165">
                 <a:solidFill>
@@ -1453,7 +1453,7 @@
                 </a:solidFill>
               </a:defRPr>
             </a:lvl7pPr>
-            <a:lvl8pPr marL="376687" indent="0">
+            <a:lvl8pPr marL="376653" indent="0">
               <a:buNone/>
               <a:defRPr sz="165">
                 <a:solidFill>
@@ -1463,7 +1463,7 @@
                 </a:solidFill>
               </a:defRPr>
             </a:lvl8pPr>
-            <a:lvl9pPr marL="430500" indent="0">
+            <a:lvl9pPr marL="430462" indent="0">
               <a:buNone/>
               <a:defRPr sz="165">
                 <a:solidFill>
@@ -1501,7 +1501,7 @@
             <a:fld id="{3ECEDDD1-02F4-488A-9AC5-C581CF75A9CB}" type="datetimeFigureOut">
               <a:rPr lang="pt-BR" smtClean="0"/>
               <a:pPr/>
-              <a:t>12/01/2014</a:t>
+              <a:t>16/09/2014</a:t>
             </a:fld>
             <a:endParaRPr lang="pt-BR"/>
           </a:p>
@@ -1544,7 +1544,7 @@
             <a:fld id="{64423969-70E0-4A52-B5D9-B4270798E610}" type="slidenum">
               <a:rPr lang="pt-BR" smtClean="0"/>
               <a:pPr/>
-              <a:t>‹#›</a:t>
+              <a:t>‹nº›</a:t>
             </a:fld>
             <a:endParaRPr lang="pt-BR"/>
           </a:p>
@@ -1610,8 +1610,8 @@
         </p:nvSpPr>
         <p:spPr>
           <a:xfrm>
-            <a:off x="115177" y="504145"/>
-            <a:ext cx="1017363" cy="1425889"/>
+            <a:off x="115178" y="420060"/>
+            <a:ext cx="1017363" cy="1188066"/>
           </a:xfrm>
         </p:spPr>
         <p:txBody>
@@ -1695,8 +1695,8 @@
         </p:nvSpPr>
         <p:spPr>
           <a:xfrm>
-            <a:off x="1170930" y="504145"/>
-            <a:ext cx="1017363" cy="1425889"/>
+            <a:off x="1170937" y="420060"/>
+            <a:ext cx="1017363" cy="1188066"/>
           </a:xfrm>
         </p:spPr>
         <p:txBody>
@@ -1786,7 +1786,7 @@
             <a:fld id="{3ECEDDD1-02F4-488A-9AC5-C581CF75A9CB}" type="datetimeFigureOut">
               <a:rPr lang="pt-BR" smtClean="0"/>
               <a:pPr/>
-              <a:t>12/01/2014</a:t>
+              <a:t>16/09/2014</a:t>
             </a:fld>
             <a:endParaRPr lang="pt-BR"/>
           </a:p>
@@ -1829,7 +1829,7 @@
             <a:fld id="{64423969-70E0-4A52-B5D9-B4270798E610}" type="slidenum">
               <a:rPr lang="pt-BR" smtClean="0"/>
               <a:pPr/>
-              <a:t>‹#›</a:t>
+              <a:t>‹nº›</a:t>
             </a:fld>
             <a:endParaRPr lang="pt-BR"/>
           </a:p>
@@ -1899,8 +1899,8 @@
         </p:nvSpPr>
         <p:spPr>
           <a:xfrm>
-            <a:off x="115177" y="483636"/>
-            <a:ext cx="1017763" cy="201555"/>
+            <a:off x="115184" y="402974"/>
+            <a:ext cx="1017763" cy="167937"/>
           </a:xfrm>
         </p:spPr>
         <p:txBody>
@@ -1910,35 +1910,35 @@
               <a:buNone/>
               <a:defRPr sz="282" b="1"/>
             </a:lvl1pPr>
-            <a:lvl2pPr marL="53812" indent="0">
+            <a:lvl2pPr marL="53808" indent="0">
               <a:buNone/>
               <a:defRPr sz="236" b="1"/>
             </a:lvl2pPr>
-            <a:lvl3pPr marL="107625" indent="0">
+            <a:lvl3pPr marL="107616" indent="0">
               <a:buNone/>
               <a:defRPr sz="212" b="1"/>
             </a:lvl3pPr>
-            <a:lvl4pPr marL="161438" indent="0">
+            <a:lvl4pPr marL="161423" indent="0">
               <a:buNone/>
               <a:defRPr sz="188" b="1"/>
             </a:lvl4pPr>
-            <a:lvl5pPr marL="215250" indent="0">
+            <a:lvl5pPr marL="215231" indent="0">
               <a:buNone/>
               <a:defRPr sz="188" b="1"/>
             </a:lvl5pPr>
-            <a:lvl6pPr marL="269062" indent="0">
+            <a:lvl6pPr marL="269038" indent="0">
               <a:buNone/>
               <a:defRPr sz="188" b="1"/>
             </a:lvl6pPr>
-            <a:lvl7pPr marL="322875" indent="0">
+            <a:lvl7pPr marL="322847" indent="0">
               <a:buNone/>
               <a:defRPr sz="188" b="1"/>
             </a:lvl7pPr>
-            <a:lvl8pPr marL="376687" indent="0">
+            <a:lvl8pPr marL="376653" indent="0">
               <a:buNone/>
               <a:defRPr sz="188" b="1"/>
             </a:lvl8pPr>
-            <a:lvl9pPr marL="430500" indent="0">
+            <a:lvl9pPr marL="430462" indent="0">
               <a:buNone/>
               <a:defRPr sz="188" b="1"/>
             </a:lvl9pPr>
@@ -1964,8 +1964,8 @@
         </p:nvSpPr>
         <p:spPr>
           <a:xfrm>
-            <a:off x="115177" y="685191"/>
-            <a:ext cx="1017763" cy="1244839"/>
+            <a:off x="115184" y="570911"/>
+            <a:ext cx="1017763" cy="1037213"/>
           </a:xfrm>
         </p:spPr>
         <p:txBody>
@@ -2049,8 +2049,8 @@
         </p:nvSpPr>
         <p:spPr>
           <a:xfrm>
-            <a:off x="1170133" y="483636"/>
-            <a:ext cx="1018163" cy="201555"/>
+            <a:off x="1170139" y="402974"/>
+            <a:ext cx="1018163" cy="167937"/>
           </a:xfrm>
         </p:spPr>
         <p:txBody>
@@ -2060,35 +2060,35 @@
               <a:buNone/>
               <a:defRPr sz="282" b="1"/>
             </a:lvl1pPr>
-            <a:lvl2pPr marL="53812" indent="0">
+            <a:lvl2pPr marL="53808" indent="0">
               <a:buNone/>
               <a:defRPr sz="236" b="1"/>
             </a:lvl2pPr>
-            <a:lvl3pPr marL="107625" indent="0">
+            <a:lvl3pPr marL="107616" indent="0">
               <a:buNone/>
               <a:defRPr sz="212" b="1"/>
             </a:lvl3pPr>
-            <a:lvl4pPr marL="161438" indent="0">
+            <a:lvl4pPr marL="161423" indent="0">
               <a:buNone/>
               <a:defRPr sz="188" b="1"/>
             </a:lvl4pPr>
-            <a:lvl5pPr marL="215250" indent="0">
+            <a:lvl5pPr marL="215231" indent="0">
               <a:buNone/>
               <a:defRPr sz="188" b="1"/>
             </a:lvl5pPr>
-            <a:lvl6pPr marL="269062" indent="0">
+            <a:lvl6pPr marL="269038" indent="0">
               <a:buNone/>
               <a:defRPr sz="188" b="1"/>
             </a:lvl6pPr>
-            <a:lvl7pPr marL="322875" indent="0">
+            <a:lvl7pPr marL="322847" indent="0">
               <a:buNone/>
               <a:defRPr sz="188" b="1"/>
             </a:lvl7pPr>
-            <a:lvl8pPr marL="376687" indent="0">
+            <a:lvl8pPr marL="376653" indent="0">
               <a:buNone/>
               <a:defRPr sz="188" b="1"/>
             </a:lvl8pPr>
-            <a:lvl9pPr marL="430500" indent="0">
+            <a:lvl9pPr marL="430462" indent="0">
               <a:buNone/>
               <a:defRPr sz="188" b="1"/>
             </a:lvl9pPr>
@@ -2114,8 +2114,8 @@
         </p:nvSpPr>
         <p:spPr>
           <a:xfrm>
-            <a:off x="1170133" y="685191"/>
-            <a:ext cx="1018163" cy="1244839"/>
+            <a:off x="1170139" y="570911"/>
+            <a:ext cx="1018163" cy="1037213"/>
           </a:xfrm>
         </p:spPr>
         <p:txBody>
@@ -2205,7 +2205,7 @@
             <a:fld id="{3ECEDDD1-02F4-488A-9AC5-C581CF75A9CB}" type="datetimeFigureOut">
               <a:rPr lang="pt-BR" smtClean="0"/>
               <a:pPr/>
-              <a:t>12/01/2014</a:t>
+              <a:t>16/09/2014</a:t>
             </a:fld>
             <a:endParaRPr lang="pt-BR"/>
           </a:p>
@@ -2248,7 +2248,7 @@
             <a:fld id="{64423969-70E0-4A52-B5D9-B4270798E610}" type="slidenum">
               <a:rPr lang="pt-BR" smtClean="0"/>
               <a:pPr/>
-              <a:t>‹#›</a:t>
+              <a:t>‹nº›</a:t>
             </a:fld>
             <a:endParaRPr lang="pt-BR"/>
           </a:p>
@@ -2320,7 +2320,7 @@
             <a:fld id="{3ECEDDD1-02F4-488A-9AC5-C581CF75A9CB}" type="datetimeFigureOut">
               <a:rPr lang="pt-BR" smtClean="0"/>
               <a:pPr/>
-              <a:t>12/01/2014</a:t>
+              <a:t>16/09/2014</a:t>
             </a:fld>
             <a:endParaRPr lang="pt-BR"/>
           </a:p>
@@ -2363,7 +2363,7 @@
             <a:fld id="{64423969-70E0-4A52-B5D9-B4270798E610}" type="slidenum">
               <a:rPr lang="pt-BR" smtClean="0"/>
               <a:pPr/>
-              <a:t>‹#›</a:t>
+              <a:t>‹nº›</a:t>
             </a:fld>
             <a:endParaRPr lang="pt-BR"/>
           </a:p>
@@ -2412,7 +2412,7 @@
             <a:fld id="{3ECEDDD1-02F4-488A-9AC5-C581CF75A9CB}" type="datetimeFigureOut">
               <a:rPr lang="pt-BR" smtClean="0"/>
               <a:pPr/>
-              <a:t>12/01/2014</a:t>
+              <a:t>16/09/2014</a:t>
             </a:fld>
             <a:endParaRPr lang="pt-BR"/>
           </a:p>
@@ -2455,7 +2455,7 @@
             <a:fld id="{64423969-70E0-4A52-B5D9-B4270798E610}" type="slidenum">
               <a:rPr lang="pt-BR" smtClean="0"/>
               <a:pPr/>
-              <a:t>‹#›</a:t>
+              <a:t>‹nº›</a:t>
             </a:fld>
             <a:endParaRPr lang="pt-BR"/>
           </a:p>
@@ -2498,8 +2498,8 @@
         </p:nvSpPr>
         <p:spPr>
           <a:xfrm>
-            <a:off x="115180" y="86031"/>
-            <a:ext cx="757824" cy="366099"/>
+            <a:off x="115180" y="71682"/>
+            <a:ext cx="757824" cy="305038"/>
           </a:xfrm>
         </p:spPr>
         <p:txBody>
@@ -2530,8 +2530,8 @@
         </p:nvSpPr>
         <p:spPr>
           <a:xfrm>
-            <a:off x="900594" y="86026"/>
-            <a:ext cx="1287699" cy="1844002"/>
+            <a:off x="900601" y="71680"/>
+            <a:ext cx="1287699" cy="1536442"/>
           </a:xfrm>
         </p:spPr>
         <p:txBody>
@@ -2615,8 +2615,8 @@
         </p:nvSpPr>
         <p:spPr>
           <a:xfrm>
-            <a:off x="115180" y="452133"/>
-            <a:ext cx="757824" cy="1477902"/>
+            <a:off x="115180" y="376724"/>
+            <a:ext cx="757824" cy="1231404"/>
           </a:xfrm>
         </p:spPr>
         <p:txBody>
@@ -2626,37 +2626,37 @@
               <a:buNone/>
               <a:defRPr sz="165"/>
             </a:lvl1pPr>
-            <a:lvl2pPr marL="53812" indent="0">
-              <a:buNone/>
-              <a:defRPr sz="141"/>
+            <a:lvl2pPr marL="53808" indent="0">
+              <a:buNone/>
+              <a:defRPr sz="140"/>
             </a:lvl2pPr>
-            <a:lvl3pPr marL="107625" indent="0">
-              <a:buNone/>
-              <a:defRPr sz="118"/>
+            <a:lvl3pPr marL="107616" indent="0">
+              <a:buNone/>
+              <a:defRPr sz="128"/>
             </a:lvl3pPr>
-            <a:lvl4pPr marL="161438" indent="0">
-              <a:buNone/>
-              <a:defRPr sz="106"/>
+            <a:lvl4pPr marL="161423" indent="0">
+              <a:buNone/>
+              <a:defRPr sz="128"/>
             </a:lvl4pPr>
-            <a:lvl5pPr marL="215250" indent="0">
-              <a:buNone/>
-              <a:defRPr sz="106"/>
+            <a:lvl5pPr marL="215231" indent="0">
+              <a:buNone/>
+              <a:defRPr sz="128"/>
             </a:lvl5pPr>
-            <a:lvl6pPr marL="269062" indent="0">
-              <a:buNone/>
-              <a:defRPr sz="106"/>
+            <a:lvl6pPr marL="269038" indent="0">
+              <a:buNone/>
+              <a:defRPr sz="128"/>
             </a:lvl6pPr>
-            <a:lvl7pPr marL="322875" indent="0">
-              <a:buNone/>
-              <a:defRPr sz="106"/>
+            <a:lvl7pPr marL="322847" indent="0">
+              <a:buNone/>
+              <a:defRPr sz="128"/>
             </a:lvl7pPr>
-            <a:lvl8pPr marL="376687" indent="0">
-              <a:buNone/>
-              <a:defRPr sz="106"/>
+            <a:lvl8pPr marL="376653" indent="0">
+              <a:buNone/>
+              <a:defRPr sz="128"/>
             </a:lvl8pPr>
-            <a:lvl9pPr marL="430500" indent="0">
-              <a:buNone/>
-              <a:defRPr sz="106"/>
+            <a:lvl9pPr marL="430462" indent="0">
+              <a:buNone/>
+              <a:defRPr sz="128"/>
             </a:lvl9pPr>
           </a:lstStyle>
           <a:p>
@@ -2686,7 +2686,7 @@
             <a:fld id="{3ECEDDD1-02F4-488A-9AC5-C581CF75A9CB}" type="datetimeFigureOut">
               <a:rPr lang="pt-BR" smtClean="0"/>
               <a:pPr/>
-              <a:t>12/01/2014</a:t>
+              <a:t>16/09/2014</a:t>
             </a:fld>
             <a:endParaRPr lang="pt-BR"/>
           </a:p>
@@ -2729,7 +2729,7 @@
             <a:fld id="{64423969-70E0-4A52-B5D9-B4270798E610}" type="slidenum">
               <a:rPr lang="pt-BR" smtClean="0"/>
               <a:pPr/>
-              <a:t>‹#›</a:t>
+              <a:t>‹nº›</a:t>
             </a:fld>
             <a:endParaRPr lang="pt-BR"/>
           </a:p>
@@ -2772,8 +2772,8 @@
         </p:nvSpPr>
         <p:spPr>
           <a:xfrm>
-            <a:off x="451498" y="1512423"/>
-            <a:ext cx="1382078" cy="178549"/>
+            <a:off x="451498" y="1260169"/>
+            <a:ext cx="1382078" cy="148769"/>
           </a:xfrm>
         </p:spPr>
         <p:txBody>
@@ -2804,8 +2804,8 @@
         </p:nvSpPr>
         <p:spPr>
           <a:xfrm>
-            <a:off x="451498" y="193057"/>
-            <a:ext cx="1382078" cy="1296353"/>
+            <a:off x="451498" y="160860"/>
+            <a:ext cx="1382078" cy="1080135"/>
           </a:xfrm>
         </p:spPr>
         <p:txBody>
@@ -2815,35 +2815,35 @@
               <a:buNone/>
               <a:defRPr sz="377"/>
             </a:lvl1pPr>
-            <a:lvl2pPr marL="53812" indent="0">
+            <a:lvl2pPr marL="53808" indent="0">
               <a:buNone/>
               <a:defRPr sz="329"/>
             </a:lvl2pPr>
-            <a:lvl3pPr marL="107625" indent="0">
+            <a:lvl3pPr marL="107616" indent="0">
               <a:buNone/>
               <a:defRPr sz="282"/>
             </a:lvl3pPr>
-            <a:lvl4pPr marL="161438" indent="0">
+            <a:lvl4pPr marL="161423" indent="0">
               <a:buNone/>
               <a:defRPr sz="236"/>
             </a:lvl4pPr>
-            <a:lvl5pPr marL="215250" indent="0">
+            <a:lvl5pPr marL="215231" indent="0">
               <a:buNone/>
               <a:defRPr sz="236"/>
             </a:lvl5pPr>
-            <a:lvl6pPr marL="269062" indent="0">
+            <a:lvl6pPr marL="269038" indent="0">
               <a:buNone/>
               <a:defRPr sz="236"/>
             </a:lvl6pPr>
-            <a:lvl7pPr marL="322875" indent="0">
+            <a:lvl7pPr marL="322847" indent="0">
               <a:buNone/>
               <a:defRPr sz="236"/>
             </a:lvl7pPr>
-            <a:lvl8pPr marL="376687" indent="0">
+            <a:lvl8pPr marL="376653" indent="0">
               <a:buNone/>
               <a:defRPr sz="236"/>
             </a:lvl8pPr>
-            <a:lvl9pPr marL="430500" indent="0">
+            <a:lvl9pPr marL="430462" indent="0">
               <a:buNone/>
               <a:defRPr sz="236"/>
             </a:lvl9pPr>
@@ -2865,8 +2865,8 @@
         </p:nvSpPr>
         <p:spPr>
           <a:xfrm>
-            <a:off x="451498" y="1690969"/>
-            <a:ext cx="1382078" cy="253568"/>
+            <a:off x="451498" y="1408936"/>
+            <a:ext cx="1382078" cy="211276"/>
           </a:xfrm>
         </p:spPr>
         <p:txBody>
@@ -2876,37 +2876,37 @@
               <a:buNone/>
               <a:defRPr sz="165"/>
             </a:lvl1pPr>
-            <a:lvl2pPr marL="53812" indent="0">
-              <a:buNone/>
-              <a:defRPr sz="141"/>
+            <a:lvl2pPr marL="53808" indent="0">
+              <a:buNone/>
+              <a:defRPr sz="140"/>
             </a:lvl2pPr>
-            <a:lvl3pPr marL="107625" indent="0">
-              <a:buNone/>
-              <a:defRPr sz="118"/>
+            <a:lvl3pPr marL="107616" indent="0">
+              <a:buNone/>
+              <a:defRPr sz="128"/>
             </a:lvl3pPr>
-            <a:lvl4pPr marL="161438" indent="0">
-              <a:buNone/>
-              <a:defRPr sz="106"/>
+            <a:lvl4pPr marL="161423" indent="0">
+              <a:buNone/>
+              <a:defRPr sz="128"/>
             </a:lvl4pPr>
-            <a:lvl5pPr marL="215250" indent="0">
-              <a:buNone/>
-              <a:defRPr sz="106"/>
+            <a:lvl5pPr marL="215231" indent="0">
+              <a:buNone/>
+              <a:defRPr sz="128"/>
             </a:lvl5pPr>
-            <a:lvl6pPr marL="269062" indent="0">
-              <a:buNone/>
-              <a:defRPr sz="106"/>
+            <a:lvl6pPr marL="269038" indent="0">
+              <a:buNone/>
+              <a:defRPr sz="128"/>
             </a:lvl6pPr>
-            <a:lvl7pPr marL="322875" indent="0">
-              <a:buNone/>
-              <a:defRPr sz="106"/>
+            <a:lvl7pPr marL="322847" indent="0">
+              <a:buNone/>
+              <a:defRPr sz="128"/>
             </a:lvl7pPr>
-            <a:lvl8pPr marL="376687" indent="0">
-              <a:buNone/>
-              <a:defRPr sz="106"/>
+            <a:lvl8pPr marL="376653" indent="0">
+              <a:buNone/>
+              <a:defRPr sz="128"/>
             </a:lvl8pPr>
-            <a:lvl9pPr marL="430500" indent="0">
-              <a:buNone/>
-              <a:defRPr sz="106"/>
+            <a:lvl9pPr marL="430462" indent="0">
+              <a:buNone/>
+              <a:defRPr sz="128"/>
             </a:lvl9pPr>
           </a:lstStyle>
           <a:p>
@@ -2936,7 +2936,7 @@
             <a:fld id="{3ECEDDD1-02F4-488A-9AC5-C581CF75A9CB}" type="datetimeFigureOut">
               <a:rPr lang="pt-BR" smtClean="0"/>
               <a:pPr/>
-              <a:t>12/01/2014</a:t>
+              <a:t>16/09/2014</a:t>
             </a:fld>
             <a:endParaRPr lang="pt-BR"/>
           </a:p>
@@ -2979,7 +2979,7 @@
             <a:fld id="{64423969-70E0-4A52-B5D9-B4270798E610}" type="slidenum">
               <a:rPr lang="pt-BR" smtClean="0"/>
               <a:pPr/>
-              <a:t>‹#›</a:t>
+              <a:t>‹nº›</a:t>
             </a:fld>
             <a:endParaRPr lang="pt-BR"/>
           </a:p>
@@ -3027,8 +3027,8 @@
         </p:nvSpPr>
         <p:spPr>
           <a:xfrm>
-            <a:off x="115176" y="86531"/>
-            <a:ext cx="2073118" cy="360098"/>
+            <a:off x="115176" y="72101"/>
+            <a:ext cx="2073118" cy="300038"/>
           </a:xfrm>
           <a:prstGeom prst="rect">
             <a:avLst/>
@@ -3060,8 +3060,8 @@
         </p:nvSpPr>
         <p:spPr>
           <a:xfrm>
-            <a:off x="115176" y="504145"/>
-            <a:ext cx="2073118" cy="1425889"/>
+            <a:off x="115176" y="420060"/>
+            <a:ext cx="2073118" cy="1188066"/>
           </a:xfrm>
           <a:prstGeom prst="rect">
             <a:avLst/>
@@ -3122,8 +3122,8 @@
         </p:nvSpPr>
         <p:spPr>
           <a:xfrm>
-            <a:off x="115178" y="2002554"/>
-            <a:ext cx="537476" cy="115031"/>
+            <a:off x="115178" y="1668551"/>
+            <a:ext cx="537476" cy="95845"/>
           </a:xfrm>
           <a:prstGeom prst="rect">
             <a:avLst/>
@@ -3133,7 +3133,7 @@
           <a:bodyPr vert="horz" lIns="91440" tIns="45720" rIns="91440" bIns="45720" rtlCol="0" anchor="ctr"/>
           <a:lstStyle>
             <a:lvl1pPr algn="l">
-              <a:defRPr sz="141">
+              <a:defRPr sz="140">
                 <a:solidFill>
                   <a:schemeClr val="tx1">
                     <a:tint val="75000"/>
@@ -3146,7 +3146,7 @@
             <a:fld id="{3ECEDDD1-02F4-488A-9AC5-C581CF75A9CB}" type="datetimeFigureOut">
               <a:rPr lang="pt-BR" smtClean="0"/>
               <a:pPr/>
-              <a:t>12/01/2014</a:t>
+              <a:t>16/09/2014</a:t>
             </a:fld>
             <a:endParaRPr lang="pt-BR"/>
           </a:p>
@@ -3164,8 +3164,8 @@
         </p:nvSpPr>
         <p:spPr>
           <a:xfrm>
-            <a:off x="787022" y="2002554"/>
-            <a:ext cx="729430" cy="115031"/>
+            <a:off x="787022" y="1668551"/>
+            <a:ext cx="729430" cy="95845"/>
           </a:xfrm>
           <a:prstGeom prst="rect">
             <a:avLst/>
@@ -3175,7 +3175,7 @@
           <a:bodyPr vert="horz" lIns="91440" tIns="45720" rIns="91440" bIns="45720" rtlCol="0" anchor="ctr"/>
           <a:lstStyle>
             <a:lvl1pPr algn="ctr">
-              <a:defRPr sz="141">
+              <a:defRPr sz="140">
                 <a:solidFill>
                   <a:schemeClr val="tx1">
                     <a:tint val="75000"/>
@@ -3201,8 +3201,8 @@
         </p:nvSpPr>
         <p:spPr>
           <a:xfrm>
-            <a:off x="1650819" y="2002554"/>
-            <a:ext cx="537476" cy="115031"/>
+            <a:off x="1650819" y="1668551"/>
+            <a:ext cx="537476" cy="95845"/>
           </a:xfrm>
           <a:prstGeom prst="rect">
             <a:avLst/>
@@ -3212,7 +3212,7 @@
           <a:bodyPr vert="horz" lIns="91440" tIns="45720" rIns="91440" bIns="45720" rtlCol="0" anchor="ctr"/>
           <a:lstStyle>
             <a:lvl1pPr algn="r">
-              <a:defRPr sz="141">
+              <a:defRPr sz="140">
                 <a:solidFill>
                   <a:schemeClr val="tx1">
                     <a:tint val="75000"/>
@@ -3225,7 +3225,7 @@
             <a:fld id="{64423969-70E0-4A52-B5D9-B4270798E610}" type="slidenum">
               <a:rPr lang="pt-BR" smtClean="0"/>
               <a:pPr/>
-              <a:t>‹#›</a:t>
+              <a:t>‹nº›</a:t>
             </a:fld>
             <a:endParaRPr lang="pt-BR"/>
           </a:p>
@@ -3249,7 +3249,7 @@
   </p:sldLayoutIdLst>
   <p:txStyles>
     <p:titleStyle>
-      <a:lvl1pPr algn="ctr" defTabSz="107625" rtl="0" eaLnBrk="1" latinLnBrk="0" hangingPunct="1">
+      <a:lvl1pPr algn="ctr" defTabSz="107616" rtl="0" eaLnBrk="1" latinLnBrk="0" hangingPunct="1">
         <a:spcBef>
           <a:spcPct val="0"/>
         </a:spcBef>
@@ -3265,7 +3265,7 @@
       </a:lvl1pPr>
     </p:titleStyle>
     <p:bodyStyle>
-      <a:lvl1pPr marL="40359" indent="-40359" algn="l" defTabSz="107625" rtl="0" eaLnBrk="1" latinLnBrk="0" hangingPunct="1">
+      <a:lvl1pPr marL="40355" indent="-40355" algn="l" defTabSz="107616" rtl="0" eaLnBrk="1" latinLnBrk="0" hangingPunct="1">
         <a:spcBef>
           <a:spcPct val="20000"/>
         </a:spcBef>
@@ -3280,7 +3280,7 @@
           <a:cs typeface="+mn-cs"/>
         </a:defRPr>
       </a:lvl1pPr>
-      <a:lvl2pPr marL="87445" indent="-33633" algn="l" defTabSz="107625" rtl="0" eaLnBrk="1" latinLnBrk="0" hangingPunct="1">
+      <a:lvl2pPr marL="87437" indent="-33630" algn="l" defTabSz="107616" rtl="0" eaLnBrk="1" latinLnBrk="0" hangingPunct="1">
         <a:spcBef>
           <a:spcPct val="20000"/>
         </a:spcBef>
@@ -3295,7 +3295,7 @@
           <a:cs typeface="+mn-cs"/>
         </a:defRPr>
       </a:lvl2pPr>
-      <a:lvl3pPr marL="134531" indent="-26907" algn="l" defTabSz="107625" rtl="0" eaLnBrk="1" latinLnBrk="0" hangingPunct="1">
+      <a:lvl3pPr marL="134519" indent="-26905" algn="l" defTabSz="107616" rtl="0" eaLnBrk="1" latinLnBrk="0" hangingPunct="1">
         <a:spcBef>
           <a:spcPct val="20000"/>
         </a:spcBef>
@@ -3310,7 +3310,7 @@
           <a:cs typeface="+mn-cs"/>
         </a:defRPr>
       </a:lvl3pPr>
-      <a:lvl4pPr marL="188344" indent="-26907" algn="l" defTabSz="107625" rtl="0" eaLnBrk="1" latinLnBrk="0" hangingPunct="1">
+      <a:lvl4pPr marL="188327" indent="-26905" algn="l" defTabSz="107616" rtl="0" eaLnBrk="1" latinLnBrk="0" hangingPunct="1">
         <a:spcBef>
           <a:spcPct val="20000"/>
         </a:spcBef>
@@ -3325,7 +3325,7 @@
           <a:cs typeface="+mn-cs"/>
         </a:defRPr>
       </a:lvl4pPr>
-      <a:lvl5pPr marL="242156" indent="-26907" algn="l" defTabSz="107625" rtl="0" eaLnBrk="1" latinLnBrk="0" hangingPunct="1">
+      <a:lvl5pPr marL="242135" indent="-26905" algn="l" defTabSz="107616" rtl="0" eaLnBrk="1" latinLnBrk="0" hangingPunct="1">
         <a:spcBef>
           <a:spcPct val="20000"/>
         </a:spcBef>
@@ -3340,7 +3340,7 @@
           <a:cs typeface="+mn-cs"/>
         </a:defRPr>
       </a:lvl5pPr>
-      <a:lvl6pPr marL="295969" indent="-26907" algn="l" defTabSz="107625" rtl="0" eaLnBrk="1" latinLnBrk="0" hangingPunct="1">
+      <a:lvl6pPr marL="295943" indent="-26905" algn="l" defTabSz="107616" rtl="0" eaLnBrk="1" latinLnBrk="0" hangingPunct="1">
         <a:spcBef>
           <a:spcPct val="20000"/>
         </a:spcBef>
@@ -3355,7 +3355,7 @@
           <a:cs typeface="+mn-cs"/>
         </a:defRPr>
       </a:lvl6pPr>
-      <a:lvl7pPr marL="349781" indent="-26907" algn="l" defTabSz="107625" rtl="0" eaLnBrk="1" latinLnBrk="0" hangingPunct="1">
+      <a:lvl7pPr marL="349749" indent="-26905" algn="l" defTabSz="107616" rtl="0" eaLnBrk="1" latinLnBrk="0" hangingPunct="1">
         <a:spcBef>
           <a:spcPct val="20000"/>
         </a:spcBef>
@@ -3370,7 +3370,7 @@
           <a:cs typeface="+mn-cs"/>
         </a:defRPr>
       </a:lvl7pPr>
-      <a:lvl8pPr marL="403594" indent="-26907" algn="l" defTabSz="107625" rtl="0" eaLnBrk="1" latinLnBrk="0" hangingPunct="1">
+      <a:lvl8pPr marL="403558" indent="-26905" algn="l" defTabSz="107616" rtl="0" eaLnBrk="1" latinLnBrk="0" hangingPunct="1">
         <a:spcBef>
           <a:spcPct val="20000"/>
         </a:spcBef>
@@ -3385,7 +3385,7 @@
           <a:cs typeface="+mn-cs"/>
         </a:defRPr>
       </a:lvl8pPr>
-      <a:lvl9pPr marL="457406" indent="-26907" algn="l" defTabSz="107625" rtl="0" eaLnBrk="1" latinLnBrk="0" hangingPunct="1">
+      <a:lvl9pPr marL="457365" indent="-26905" algn="l" defTabSz="107616" rtl="0" eaLnBrk="1" latinLnBrk="0" hangingPunct="1">
         <a:spcBef>
           <a:spcPct val="20000"/>
         </a:spcBef>
@@ -3405,7 +3405,7 @@
       <a:defPPr>
         <a:defRPr lang="pt-BR"/>
       </a:defPPr>
-      <a:lvl1pPr marL="0" algn="l" defTabSz="107625" rtl="0" eaLnBrk="1" latinLnBrk="0" hangingPunct="1">
+      <a:lvl1pPr marL="0" algn="l" defTabSz="107616" rtl="0" eaLnBrk="1" latinLnBrk="0" hangingPunct="1">
         <a:defRPr sz="212" kern="1200">
           <a:solidFill>
             <a:schemeClr val="tx1"/>
@@ -3415,7 +3415,7 @@
           <a:cs typeface="+mn-cs"/>
         </a:defRPr>
       </a:lvl1pPr>
-      <a:lvl2pPr marL="53812" algn="l" defTabSz="107625" rtl="0" eaLnBrk="1" latinLnBrk="0" hangingPunct="1">
+      <a:lvl2pPr marL="53808" algn="l" defTabSz="107616" rtl="0" eaLnBrk="1" latinLnBrk="0" hangingPunct="1">
         <a:defRPr sz="212" kern="1200">
           <a:solidFill>
             <a:schemeClr val="tx1"/>
@@ -3425,7 +3425,7 @@
           <a:cs typeface="+mn-cs"/>
         </a:defRPr>
       </a:lvl2pPr>
-      <a:lvl3pPr marL="107625" algn="l" defTabSz="107625" rtl="0" eaLnBrk="1" latinLnBrk="0" hangingPunct="1">
+      <a:lvl3pPr marL="107616" algn="l" defTabSz="107616" rtl="0" eaLnBrk="1" latinLnBrk="0" hangingPunct="1">
         <a:defRPr sz="212" kern="1200">
           <a:solidFill>
             <a:schemeClr val="tx1"/>
@@ -3435,7 +3435,7 @@
           <a:cs typeface="+mn-cs"/>
         </a:defRPr>
       </a:lvl3pPr>
-      <a:lvl4pPr marL="161438" algn="l" defTabSz="107625" rtl="0" eaLnBrk="1" latinLnBrk="0" hangingPunct="1">
+      <a:lvl4pPr marL="161423" algn="l" defTabSz="107616" rtl="0" eaLnBrk="1" latinLnBrk="0" hangingPunct="1">
         <a:defRPr sz="212" kern="1200">
           <a:solidFill>
             <a:schemeClr val="tx1"/>
@@ -3445,7 +3445,7 @@
           <a:cs typeface="+mn-cs"/>
         </a:defRPr>
       </a:lvl4pPr>
-      <a:lvl5pPr marL="215250" algn="l" defTabSz="107625" rtl="0" eaLnBrk="1" latinLnBrk="0" hangingPunct="1">
+      <a:lvl5pPr marL="215231" algn="l" defTabSz="107616" rtl="0" eaLnBrk="1" latinLnBrk="0" hangingPunct="1">
         <a:defRPr sz="212" kern="1200">
           <a:solidFill>
             <a:schemeClr val="tx1"/>
@@ -3455,7 +3455,7 @@
           <a:cs typeface="+mn-cs"/>
         </a:defRPr>
       </a:lvl5pPr>
-      <a:lvl6pPr marL="269062" algn="l" defTabSz="107625" rtl="0" eaLnBrk="1" latinLnBrk="0" hangingPunct="1">
+      <a:lvl6pPr marL="269038" algn="l" defTabSz="107616" rtl="0" eaLnBrk="1" latinLnBrk="0" hangingPunct="1">
         <a:defRPr sz="212" kern="1200">
           <a:solidFill>
             <a:schemeClr val="tx1"/>
@@ -3465,7 +3465,7 @@
           <a:cs typeface="+mn-cs"/>
         </a:defRPr>
       </a:lvl6pPr>
-      <a:lvl7pPr marL="322875" algn="l" defTabSz="107625" rtl="0" eaLnBrk="1" latinLnBrk="0" hangingPunct="1">
+      <a:lvl7pPr marL="322847" algn="l" defTabSz="107616" rtl="0" eaLnBrk="1" latinLnBrk="0" hangingPunct="1">
         <a:defRPr sz="212" kern="1200">
           <a:solidFill>
             <a:schemeClr val="tx1"/>
@@ -3475,7 +3475,7 @@
           <a:cs typeface="+mn-cs"/>
         </a:defRPr>
       </a:lvl7pPr>
-      <a:lvl8pPr marL="376687" algn="l" defTabSz="107625" rtl="0" eaLnBrk="1" latinLnBrk="0" hangingPunct="1">
+      <a:lvl8pPr marL="376653" algn="l" defTabSz="107616" rtl="0" eaLnBrk="1" latinLnBrk="0" hangingPunct="1">
         <a:defRPr sz="212" kern="1200">
           <a:solidFill>
             <a:schemeClr val="tx1"/>
@@ -3485,7 +3485,7 @@
           <a:cs typeface="+mn-cs"/>
         </a:defRPr>
       </a:lvl8pPr>
-      <a:lvl9pPr marL="430500" algn="l" defTabSz="107625" rtl="0" eaLnBrk="1" latinLnBrk="0" hangingPunct="1">
+      <a:lvl9pPr marL="430462" algn="l" defTabSz="107616" rtl="0" eaLnBrk="1" latinLnBrk="0" hangingPunct="1">
         <a:defRPr sz="212" kern="1200">
           <a:solidFill>
             <a:schemeClr val="tx1"/>
@@ -3525,10 +3525,10 @@
         </p:nvGrpSpPr>
         <p:grpSpPr>
           <a:xfrm>
-            <a:off x="0" y="76345"/>
-            <a:ext cx="2366007" cy="2078526"/>
+            <a:off x="-30896" y="4016"/>
+            <a:ext cx="2366006" cy="1924158"/>
             <a:chOff x="3096078" y="84972"/>
-            <a:chExt cx="2366007" cy="2078526"/>
+            <a:chExt cx="2366007" cy="1924162"/>
           </a:xfrm>
         </p:grpSpPr>
         <p:sp>
@@ -3555,7 +3555,7 @@
             <a:p>
               <a:pPr algn="ctr"/>
               <a:r>
-                <a:rPr lang="pt-BR" sz="800" dirty="0" smtClean="0"/>
+                <a:rPr lang="pt-BR" sz="800" dirty="0"/>
                 <a:t>Amplitude [dB]</a:t>
               </a:r>
               <a:endParaRPr lang="pt-BR" sz="800" dirty="0"/>
@@ -3810,13 +3810,13 @@
                 </a:ext>
               </a:extLst>
             </a:blip>
-            <a:srcRect l="9008" t="5001" r="85136" b="10023"/>
+            <a:srcRect l="9008" t="5001" r="85136" b="21685"/>
             <a:stretch/>
           </p:blipFill>
           <p:spPr>
             <a:xfrm>
-              <a:off x="3304881" y="84972"/>
-              <a:ext cx="216000" cy="1836000"/>
+              <a:off x="3307932" y="85565"/>
+              <a:ext cx="215999" cy="1584000"/>
             </a:xfrm>
             <a:prstGeom prst="rect">
               <a:avLst/>
@@ -3831,8 +3831,8 @@
           </p:nvSpPr>
           <p:spPr>
             <a:xfrm>
-              <a:off x="3936457" y="1948054"/>
-              <a:ext cx="934579" cy="215444"/>
+              <a:off x="3947537" y="1626738"/>
+              <a:ext cx="934578" cy="215444"/>
             </a:xfrm>
             <a:prstGeom prst="rect">
               <a:avLst/>
@@ -3847,7 +3847,7 @@
             <a:p>
               <a:pPr algn="ctr"/>
               <a:r>
-                <a:rPr lang="pt-BR" sz="800" dirty="0" smtClean="0"/>
+                <a:rPr lang="pt-BR" sz="800" dirty="0"/>
                 <a:t>Frequência [GHz]</a:t>
               </a:r>
               <a:endParaRPr lang="pt-BR" sz="800" dirty="0"/>
@@ -3863,7 +3863,7 @@
         </p:nvSpPr>
         <p:spPr>
           <a:xfrm>
-            <a:off x="364616" y="112600"/>
+            <a:off x="333725" y="40271"/>
             <a:ext cx="802459" cy="307777"/>
           </a:xfrm>
           <a:prstGeom prst="rect">
@@ -3879,7 +3879,7 @@
           <a:p>
             <a:pPr algn="ctr"/>
             <a:r>
-              <a:rPr lang="pt-BR" sz="700" b="1" dirty="0" smtClean="0"/>
+              <a:rPr lang="pt-BR" sz="700" b="1" dirty="0"/>
               <a:t>Produtos de Intermodulação</a:t>
             </a:r>
             <a:endParaRPr lang="pt-BR" sz="700" b="1" dirty="0"/>
@@ -3894,7 +3894,7 @@
         </p:nvSpPr>
         <p:spPr>
           <a:xfrm>
-            <a:off x="1488947" y="115451"/>
+            <a:off x="1458055" y="43125"/>
             <a:ext cx="802459" cy="307777"/>
           </a:xfrm>
           <a:prstGeom prst="rect">
@@ -3910,11 +3910,11 @@
           <a:p>
             <a:pPr algn="ctr"/>
             <a:r>
-              <a:rPr lang="pt-BR" sz="700" b="1" dirty="0" err="1" smtClean="0"/>
+              <a:rPr lang="pt-BR" sz="700" b="1" dirty="0" err="1"/>
               <a:t>Subportadoras</a:t>
             </a:r>
             <a:r>
-              <a:rPr lang="pt-BR" sz="700" b="1" dirty="0" smtClean="0"/>
+              <a:rPr lang="pt-BR" sz="700" b="1" dirty="0"/>
               <a:t> de Informação</a:t>
             </a:r>
             <a:endParaRPr lang="pt-BR" sz="700" b="1" dirty="0"/>
@@ -3929,7 +3929,7 @@
         </p:nvSpPr>
         <p:spPr>
           <a:xfrm>
-            <a:off x="879806" y="266488"/>
+            <a:off x="848914" y="194159"/>
             <a:ext cx="357796" cy="514803"/>
           </a:xfrm>
           <a:prstGeom prst="arc">
@@ -3974,7 +3974,7 @@
         </p:nvSpPr>
         <p:spPr>
           <a:xfrm>
-            <a:off x="1019861" y="420378"/>
+            <a:off x="988973" y="348045"/>
             <a:ext cx="479025" cy="468036"/>
           </a:xfrm>
           <a:prstGeom prst="ellipse">
@@ -4023,7 +4023,7 @@
         </p:nvSpPr>
         <p:spPr>
           <a:xfrm flipH="1">
-            <a:off x="1774469" y="332875"/>
+            <a:off x="1743573" y="260545"/>
             <a:ext cx="554514" cy="514803"/>
           </a:xfrm>
           <a:prstGeom prst="arc">
@@ -4068,7 +4068,7 @@
         </p:nvSpPr>
         <p:spPr>
           <a:xfrm>
-            <a:off x="362225" y="1796612"/>
+            <a:off x="331330" y="1724279"/>
             <a:ext cx="1794914" cy="197460"/>
           </a:xfrm>
           <a:prstGeom prst="rect">
@@ -4116,8 +4116,8 @@
         </p:nvCxnSpPr>
         <p:spPr>
           <a:xfrm flipH="1">
-            <a:off x="362225" y="1910001"/>
-            <a:ext cx="1801620" cy="0"/>
+            <a:off x="331334" y="1512017"/>
+            <a:ext cx="1801621" cy="0"/>
           </a:xfrm>
           <a:prstGeom prst="line">
             <a:avLst/>
@@ -4151,7 +4151,7 @@
         </p:nvCxnSpPr>
         <p:spPr>
           <a:xfrm flipV="1">
-            <a:off x="362500" y="1613362"/>
+            <a:off x="331605" y="1541033"/>
             <a:ext cx="0" cy="296639"/>
           </a:xfrm>
           <a:prstGeom prst="line">
@@ -4186,8 +4186,8 @@
         </p:nvSpPr>
         <p:spPr>
           <a:xfrm>
-            <a:off x="1874850" y="1859561"/>
-            <a:ext cx="326638" cy="184666"/>
+            <a:off x="1864697" y="1482320"/>
+            <a:ext cx="326637" cy="184666"/>
           </a:xfrm>
           <a:prstGeom prst="rect">
             <a:avLst/>
@@ -4202,12 +4202,8 @@
           <a:p>
             <a:pPr algn="ctr"/>
             <a:r>
-              <a:rPr lang="pt-BR" sz="600" dirty="0" smtClean="0"/>
-              <a:t>+</a:t>
-            </a:r>
-            <a:r>
-              <a:rPr lang="pt-BR" sz="600" dirty="0" smtClean="0"/>
-              <a:t>2</a:t>
+              <a:rPr lang="pt-BR" sz="600" dirty="0"/>
+              <a:t>+2</a:t>
             </a:r>
             <a:endParaRPr lang="pt-BR" sz="600" dirty="0"/>
           </a:p>
@@ -4221,7 +4217,7 @@
         </p:nvSpPr>
         <p:spPr>
           <a:xfrm>
-            <a:off x="453800" y="1771501"/>
+            <a:off x="414630" y="1402535"/>
             <a:ext cx="262490" cy="276999"/>
           </a:xfrm>
           <a:prstGeom prst="rect">
@@ -4241,12 +4237,8 @@
           <a:p>
             <a:pPr algn="ctr"/>
             <a:r>
-              <a:rPr lang="pt-BR" sz="600" dirty="0" smtClean="0"/>
-              <a:t>-</a:t>
-            </a:r>
-            <a:r>
-              <a:rPr lang="pt-BR" sz="600" dirty="0" smtClean="0"/>
-              <a:t>2</a:t>
+              <a:rPr lang="pt-BR" sz="600" dirty="0"/>
+              <a:t>-2</a:t>
             </a:r>
             <a:endParaRPr lang="pt-BR" sz="600" dirty="0"/>
           </a:p>
@@ -4260,7 +4252,7 @@
         </p:nvSpPr>
         <p:spPr>
           <a:xfrm>
-            <a:off x="1154189" y="1765805"/>
+            <a:off x="1123506" y="1395172"/>
             <a:ext cx="262490" cy="276999"/>
           </a:xfrm>
           <a:prstGeom prst="rect">
@@ -4280,13 +4272,100 @@
           <a:p>
             <a:pPr algn="ctr"/>
             <a:r>
-              <a:rPr lang="pt-BR" sz="600" dirty="0" smtClean="0"/>
+              <a:rPr lang="pt-BR" sz="600" dirty="0"/>
               <a:t>0</a:t>
             </a:r>
             <a:endParaRPr lang="pt-BR" sz="600" dirty="0"/>
           </a:p>
         </p:txBody>
       </p:sp>
+      <p:pic>
+        <p:nvPicPr>
+          <p:cNvPr id="27" name="Picture 228"/>
+          <p:cNvPicPr>
+            <a:picLocks noChangeAspect="1"/>
+          </p:cNvPicPr>
+          <p:nvPr/>
+        </p:nvPicPr>
+        <p:blipFill rotWithShape="1">
+          <a:blip r:embed="rId3">
+            <a:extLst>
+              <a:ext uri="{28A0092B-C50C-407E-A947-70E740481C1C}">
+                <a14:useLocalDpi xmlns:a14="http://schemas.microsoft.com/office/drawing/2010/main" val="0"/>
+              </a:ext>
+            </a:extLst>
+          </a:blip>
+          <a:srcRect l="22174" t="9180" r="69040" b="62493"/>
+          <a:stretch/>
+        </p:blipFill>
+        <p:spPr>
+          <a:xfrm>
+            <a:off x="2104314" y="1514870"/>
+            <a:ext cx="271554" cy="348562"/>
+          </a:xfrm>
+          <a:prstGeom prst="rect">
+            <a:avLst/>
+          </a:prstGeom>
+        </p:spPr>
+      </p:pic>
+      <p:pic>
+        <p:nvPicPr>
+          <p:cNvPr id="29" name="Picture 228"/>
+          <p:cNvPicPr>
+            <a:picLocks noChangeAspect="1"/>
+          </p:cNvPicPr>
+          <p:nvPr/>
+        </p:nvPicPr>
+        <p:blipFill rotWithShape="1">
+          <a:blip r:embed="rId3" cstate="print">
+            <a:extLst>
+              <a:ext uri="{28A0092B-C50C-407E-A947-70E740481C1C}">
+                <a14:useLocalDpi xmlns:a14="http://schemas.microsoft.com/office/drawing/2010/main" val="0"/>
+              </a:ext>
+            </a:extLst>
+          </a:blip>
+          <a:srcRect l="22174" t="9180" r="69040" b="62493"/>
+          <a:stretch/>
+        </p:blipFill>
+        <p:spPr>
+          <a:xfrm>
+            <a:off x="311319" y="1516804"/>
+            <a:ext cx="175312" cy="329532"/>
+          </a:xfrm>
+          <a:prstGeom prst="rect">
+            <a:avLst/>
+          </a:prstGeom>
+        </p:spPr>
+      </p:pic>
+      <p:pic>
+        <p:nvPicPr>
+          <p:cNvPr id="30" name="Picture 228"/>
+          <p:cNvPicPr>
+            <a:picLocks noChangeAspect="1"/>
+          </p:cNvPicPr>
+          <p:nvPr/>
+        </p:nvPicPr>
+        <p:blipFill rotWithShape="1">
+          <a:blip r:embed="rId3" cstate="print">
+            <a:extLst>
+              <a:ext uri="{28A0092B-C50C-407E-A947-70E740481C1C}">
+                <a14:useLocalDpi xmlns:a14="http://schemas.microsoft.com/office/drawing/2010/main" val="0"/>
+              </a:ext>
+            </a:extLst>
+          </a:blip>
+          <a:srcRect l="22174" t="9180" r="69040" b="62493"/>
+          <a:stretch/>
+        </p:blipFill>
+        <p:spPr>
+          <a:xfrm>
+            <a:off x="165611" y="1660409"/>
+            <a:ext cx="175312" cy="225028"/>
+          </a:xfrm>
+          <a:prstGeom prst="rect">
+            <a:avLst/>
+          </a:prstGeom>
+        </p:spPr>
+      </p:pic>
     </p:spTree>
   </p:cSld>
   <p:clrMapOvr>

</xml_diff>